<commit_message>
Sauvegarde rapide du soir
</commit_message>
<xml_diff>
--- a/901_Anglais/ULMER Catherine/IDE/Visual Studio.pptx
+++ b/901_Anglais/ULMER Catherine/IDE/Visual Studio.pptx
@@ -109,6 +109,11 @@
       </a:defRPr>
     </a:lvl9pPr>
   </p:defaultTextStyle>
+  <p:extLst>
+    <p:ext uri="{EFAFB233-063F-42B5-8137-9DF3F51BA10A}">
+      <p15:sldGuideLst xmlns:p15="http://schemas.microsoft.com/office/powerpoint/2012/main"/>
+    </p:ext>
+  </p:extLst>
 </p:presentation>
 </file>
 
@@ -243,7 +248,7 @@
           <a:p>
             <a:fld id="{1F00B07D-6C2A-49A9-BC22-D728035ED858}" type="datetimeFigureOut">
               <a:rPr lang="fr-FR" smtClean="0"/>
-              <a:t>09/10/2022</a:t>
+              <a:t>09/02/2023</a:t>
             </a:fld>
             <a:endParaRPr lang="fr-FR"/>
           </a:p>
@@ -413,7 +418,7 @@
           <a:p>
             <a:fld id="{1F00B07D-6C2A-49A9-BC22-D728035ED858}" type="datetimeFigureOut">
               <a:rPr lang="fr-FR" smtClean="0"/>
-              <a:t>09/10/2022</a:t>
+              <a:t>09/02/2023</a:t>
             </a:fld>
             <a:endParaRPr lang="fr-FR"/>
           </a:p>
@@ -593,7 +598,7 @@
           <a:p>
             <a:fld id="{1F00B07D-6C2A-49A9-BC22-D728035ED858}" type="datetimeFigureOut">
               <a:rPr lang="fr-FR" smtClean="0"/>
-              <a:t>09/10/2022</a:t>
+              <a:t>09/02/2023</a:t>
             </a:fld>
             <a:endParaRPr lang="fr-FR"/>
           </a:p>
@@ -763,7 +768,7 @@
           <a:p>
             <a:fld id="{1F00B07D-6C2A-49A9-BC22-D728035ED858}" type="datetimeFigureOut">
               <a:rPr lang="fr-FR" smtClean="0"/>
-              <a:t>09/10/2022</a:t>
+              <a:t>09/02/2023</a:t>
             </a:fld>
             <a:endParaRPr lang="fr-FR"/>
           </a:p>
@@ -1009,7 +1014,7 @@
           <a:p>
             <a:fld id="{1F00B07D-6C2A-49A9-BC22-D728035ED858}" type="datetimeFigureOut">
               <a:rPr lang="fr-FR" smtClean="0"/>
-              <a:t>09/10/2022</a:t>
+              <a:t>09/02/2023</a:t>
             </a:fld>
             <a:endParaRPr lang="fr-FR"/>
           </a:p>
@@ -1241,7 +1246,7 @@
           <a:p>
             <a:fld id="{1F00B07D-6C2A-49A9-BC22-D728035ED858}" type="datetimeFigureOut">
               <a:rPr lang="fr-FR" smtClean="0"/>
-              <a:t>09/10/2022</a:t>
+              <a:t>09/02/2023</a:t>
             </a:fld>
             <a:endParaRPr lang="fr-FR"/>
           </a:p>
@@ -1608,7 +1613,7 @@
           <a:p>
             <a:fld id="{1F00B07D-6C2A-49A9-BC22-D728035ED858}" type="datetimeFigureOut">
               <a:rPr lang="fr-FR" smtClean="0"/>
-              <a:t>09/10/2022</a:t>
+              <a:t>09/02/2023</a:t>
             </a:fld>
             <a:endParaRPr lang="fr-FR"/>
           </a:p>
@@ -1726,7 +1731,7 @@
           <a:p>
             <a:fld id="{1F00B07D-6C2A-49A9-BC22-D728035ED858}" type="datetimeFigureOut">
               <a:rPr lang="fr-FR" smtClean="0"/>
-              <a:t>09/10/2022</a:t>
+              <a:t>09/02/2023</a:t>
             </a:fld>
             <a:endParaRPr lang="fr-FR"/>
           </a:p>
@@ -1821,7 +1826,7 @@
           <a:p>
             <a:fld id="{1F00B07D-6C2A-49A9-BC22-D728035ED858}" type="datetimeFigureOut">
               <a:rPr lang="fr-FR" smtClean="0"/>
-              <a:t>09/10/2022</a:t>
+              <a:t>09/02/2023</a:t>
             </a:fld>
             <a:endParaRPr lang="fr-FR"/>
           </a:p>
@@ -2098,7 +2103,7 @@
           <a:p>
             <a:fld id="{1F00B07D-6C2A-49A9-BC22-D728035ED858}" type="datetimeFigureOut">
               <a:rPr lang="fr-FR" smtClean="0"/>
-              <a:t>09/10/2022</a:t>
+              <a:t>09/02/2023</a:t>
             </a:fld>
             <a:endParaRPr lang="fr-FR"/>
           </a:p>
@@ -2355,7 +2360,7 @@
           <a:p>
             <a:fld id="{1F00B07D-6C2A-49A9-BC22-D728035ED858}" type="datetimeFigureOut">
               <a:rPr lang="fr-FR" smtClean="0"/>
-              <a:t>09/10/2022</a:t>
+              <a:t>09/02/2023</a:t>
             </a:fld>
             <a:endParaRPr lang="fr-FR"/>
           </a:p>
@@ -2568,7 +2573,7 @@
           <a:p>
             <a:fld id="{1F00B07D-6C2A-49A9-BC22-D728035ED858}" type="datetimeFigureOut">
               <a:rPr lang="fr-FR" smtClean="0"/>
-              <a:t>09/10/2022</a:t>
+              <a:t>09/02/2023</a:t>
             </a:fld>
             <a:endParaRPr lang="fr-FR"/>
           </a:p>
@@ -3766,10 +3771,10 @@
       </p:grpSpPr>
       <p:pic>
         <p:nvPicPr>
-          <p:cNvPr id="5" name="Image 4">
+          <p:cNvPr id="3" name="Image 2" descr="Une image contenant texte, moniteur, capture d’écran, noir&#10;&#10;Description générée automatiquement">
             <a:extLst>
               <a:ext uri="{FF2B5EF4-FFF2-40B4-BE49-F238E27FC236}">
-                <a16:creationId xmlns:a16="http://schemas.microsoft.com/office/drawing/2014/main" id="{960D741C-F369-C714-4DED-11ED85A8C775}"/>
+                <a16:creationId xmlns:a16="http://schemas.microsoft.com/office/drawing/2014/main" id="{95B59819-BED8-187D-5BFC-2FCFA254EC3B}"/>
               </a:ext>
             </a:extLst>
           </p:cNvPr>
@@ -3779,15 +3784,21 @@
           <p:nvPr/>
         </p:nvPicPr>
         <p:blipFill>
-          <a:blip r:embed="rId2"/>
+          <a:blip r:embed="rId2">
+            <a:extLst>
+              <a:ext uri="{28A0092B-C50C-407E-A947-70E740481C1C}">
+                <a14:useLocalDpi xmlns:a14="http://schemas.microsoft.com/office/drawing/2010/main" val="0"/>
+              </a:ext>
+            </a:extLst>
+          </a:blip>
           <a:stretch>
             <a:fillRect/>
           </a:stretch>
         </p:blipFill>
         <p:spPr>
           <a:xfrm>
-            <a:off x="0" y="152400"/>
-            <a:ext cx="12192000" cy="6553200"/>
+            <a:off x="399107" y="0"/>
+            <a:ext cx="11393786" cy="6858000"/>
           </a:xfrm>
           <a:prstGeom prst="rect">
             <a:avLst/>
@@ -3875,10 +3886,10 @@
       </p:grpSpPr>
       <p:pic>
         <p:nvPicPr>
-          <p:cNvPr id="3" name="Image 2">
+          <p:cNvPr id="5" name="Image 4" descr="Une image contenant texte, moniteur, capture d’écran, intérieur&#10;&#10;Description générée automatiquement">
             <a:extLst>
               <a:ext uri="{FF2B5EF4-FFF2-40B4-BE49-F238E27FC236}">
-                <a16:creationId xmlns:a16="http://schemas.microsoft.com/office/drawing/2014/main" id="{99B9B70F-A939-6CAE-6303-58078809FC1F}"/>
+                <a16:creationId xmlns:a16="http://schemas.microsoft.com/office/drawing/2014/main" id="{39566098-869E-C996-77EB-BD0DF2902857}"/>
               </a:ext>
             </a:extLst>
           </p:cNvPr>
@@ -3888,15 +3899,21 @@
           <p:nvPr/>
         </p:nvPicPr>
         <p:blipFill>
-          <a:blip r:embed="rId2"/>
+          <a:blip r:embed="rId2">
+            <a:extLst>
+              <a:ext uri="{28A0092B-C50C-407E-A947-70E740481C1C}">
+                <a14:useLocalDpi xmlns:a14="http://schemas.microsoft.com/office/drawing/2010/main" val="0"/>
+              </a:ext>
+            </a:extLst>
+          </a:blip>
           <a:stretch>
             <a:fillRect/>
           </a:stretch>
         </p:blipFill>
         <p:spPr>
           <a:xfrm>
-            <a:off x="0" y="152400"/>
-            <a:ext cx="12192000" cy="6553200"/>
+            <a:off x="399107" y="0"/>
+            <a:ext cx="11393786" cy="6858000"/>
           </a:xfrm>
           <a:prstGeom prst="rect">
             <a:avLst/>
@@ -3984,10 +4001,10 @@
       </p:grpSpPr>
       <p:pic>
         <p:nvPicPr>
-          <p:cNvPr id="3" name="Image 2">
+          <p:cNvPr id="7" name="Image 6" descr="Une image contenant texte&#10;&#10;Description générée automatiquement">
             <a:extLst>
               <a:ext uri="{FF2B5EF4-FFF2-40B4-BE49-F238E27FC236}">
-                <a16:creationId xmlns:a16="http://schemas.microsoft.com/office/drawing/2014/main" id="{87CDF179-942D-3CFA-DDE7-D63423CB08A5}"/>
+                <a16:creationId xmlns:a16="http://schemas.microsoft.com/office/drawing/2014/main" id="{4E277219-7FFF-868C-CC24-F81251515C90}"/>
               </a:ext>
             </a:extLst>
           </p:cNvPr>
@@ -3997,15 +4014,21 @@
           <p:nvPr/>
         </p:nvPicPr>
         <p:blipFill>
-          <a:blip r:embed="rId2"/>
+          <a:blip r:embed="rId2">
+            <a:extLst>
+              <a:ext uri="{28A0092B-C50C-407E-A947-70E740481C1C}">
+                <a14:useLocalDpi xmlns:a14="http://schemas.microsoft.com/office/drawing/2010/main" val="0"/>
+              </a:ext>
+            </a:extLst>
+          </a:blip>
           <a:stretch>
             <a:fillRect/>
           </a:stretch>
         </p:blipFill>
         <p:spPr>
           <a:xfrm>
-            <a:off x="0" y="152400"/>
-            <a:ext cx="12192000" cy="6553200"/>
+            <a:off x="607639" y="0"/>
+            <a:ext cx="10976722" cy="6858000"/>
           </a:xfrm>
           <a:prstGeom prst="rect">
             <a:avLst/>

</xml_diff>